<commit_message>
Update @ May 13, 2016
</commit_message>
<xml_diff>
--- a/report.pptx
+++ b/report.pptx
@@ -12,9 +12,9 @@
     <p:sldId id="319" r:id="rId3"/>
     <p:sldId id="328" r:id="rId4"/>
     <p:sldId id="340" r:id="rId5"/>
-    <p:sldId id="358" r:id="rId6"/>
-    <p:sldId id="359" r:id="rId7"/>
-    <p:sldId id="342" r:id="rId8"/>
+    <p:sldId id="360" r:id="rId6"/>
+    <p:sldId id="358" r:id="rId7"/>
+    <p:sldId id="359" r:id="rId8"/>
     <p:sldId id="343" r:id="rId9"/>
     <p:sldId id="356" r:id="rId10"/>
     <p:sldId id="357" r:id="rId11"/>
@@ -202,7 +202,7 @@
           <a:p>
             <a:fld id="{454B8DFA-D9CC-524F-98EB-B8454C2B8E7D}" type="datetimeFigureOut">
               <a:rPr lang="en-US" smtClean="0"/>
-              <a:t>5/11/16</a:t>
+              <a:t>5/13/16</a:t>
             </a:fld>
             <a:endParaRPr lang="en-US"/>
           </a:p>
@@ -651,7 +651,7 @@
           <a:p>
             <a:fld id="{A77D504C-442B-3F45-A88F-8DED3B517CC3}" type="datetimeFigureOut">
               <a:rPr lang="en-US" smtClean="0"/>
-              <a:t>5/11/16</a:t>
+              <a:t>5/13/16</a:t>
             </a:fld>
             <a:endParaRPr lang="en-US"/>
           </a:p>
@@ -821,7 +821,7 @@
           <a:p>
             <a:fld id="{A77D504C-442B-3F45-A88F-8DED3B517CC3}" type="datetimeFigureOut">
               <a:rPr lang="en-US" smtClean="0"/>
-              <a:t>5/11/16</a:t>
+              <a:t>5/13/16</a:t>
             </a:fld>
             <a:endParaRPr lang="en-US"/>
           </a:p>
@@ -1001,7 +1001,7 @@
           <a:p>
             <a:fld id="{A77D504C-442B-3F45-A88F-8DED3B517CC3}" type="datetimeFigureOut">
               <a:rPr lang="en-US" smtClean="0"/>
-              <a:t>5/11/16</a:t>
+              <a:t>5/13/16</a:t>
             </a:fld>
             <a:endParaRPr lang="en-US"/>
           </a:p>
@@ -1171,7 +1171,7 @@
           <a:p>
             <a:fld id="{A77D504C-442B-3F45-A88F-8DED3B517CC3}" type="datetimeFigureOut">
               <a:rPr lang="en-US" smtClean="0"/>
-              <a:t>5/11/16</a:t>
+              <a:t>5/13/16</a:t>
             </a:fld>
             <a:endParaRPr lang="en-US"/>
           </a:p>
@@ -1417,7 +1417,7 @@
           <a:p>
             <a:fld id="{A77D504C-442B-3F45-A88F-8DED3B517CC3}" type="datetimeFigureOut">
               <a:rPr lang="en-US" smtClean="0"/>
-              <a:t>5/11/16</a:t>
+              <a:t>5/13/16</a:t>
             </a:fld>
             <a:endParaRPr lang="en-US"/>
           </a:p>
@@ -1705,7 +1705,7 @@
           <a:p>
             <a:fld id="{A77D504C-442B-3F45-A88F-8DED3B517CC3}" type="datetimeFigureOut">
               <a:rPr lang="en-US" smtClean="0"/>
-              <a:t>5/11/16</a:t>
+              <a:t>5/13/16</a:t>
             </a:fld>
             <a:endParaRPr lang="en-US"/>
           </a:p>
@@ -2127,7 +2127,7 @@
           <a:p>
             <a:fld id="{A77D504C-442B-3F45-A88F-8DED3B517CC3}" type="datetimeFigureOut">
               <a:rPr lang="en-US" smtClean="0"/>
-              <a:t>5/11/16</a:t>
+              <a:t>5/13/16</a:t>
             </a:fld>
             <a:endParaRPr lang="en-US"/>
           </a:p>
@@ -2245,7 +2245,7 @@
           <a:p>
             <a:fld id="{A77D504C-442B-3F45-A88F-8DED3B517CC3}" type="datetimeFigureOut">
               <a:rPr lang="en-US" smtClean="0"/>
-              <a:t>5/11/16</a:t>
+              <a:t>5/13/16</a:t>
             </a:fld>
             <a:endParaRPr lang="en-US"/>
           </a:p>
@@ -2340,7 +2340,7 @@
           <a:p>
             <a:fld id="{A77D504C-442B-3F45-A88F-8DED3B517CC3}" type="datetimeFigureOut">
               <a:rPr lang="en-US" smtClean="0"/>
-              <a:t>5/11/16</a:t>
+              <a:t>5/13/16</a:t>
             </a:fld>
             <a:endParaRPr lang="en-US"/>
           </a:p>
@@ -2617,7 +2617,7 @@
           <a:p>
             <a:fld id="{A77D504C-442B-3F45-A88F-8DED3B517CC3}" type="datetimeFigureOut">
               <a:rPr lang="en-US" smtClean="0"/>
-              <a:t>5/11/16</a:t>
+              <a:t>5/13/16</a:t>
             </a:fld>
             <a:endParaRPr lang="en-US"/>
           </a:p>
@@ -2870,7 +2870,7 @@
           <a:p>
             <a:fld id="{A77D504C-442B-3F45-A88F-8DED3B517CC3}" type="datetimeFigureOut">
               <a:rPr lang="en-US" smtClean="0"/>
-              <a:t>5/11/16</a:t>
+              <a:t>5/13/16</a:t>
             </a:fld>
             <a:endParaRPr lang="en-US"/>
           </a:p>
@@ -3083,7 +3083,7 @@
           <a:p>
             <a:fld id="{A77D504C-442B-3F45-A88F-8DED3B517CC3}" type="datetimeFigureOut">
               <a:rPr lang="en-US" smtClean="0"/>
-              <a:t>5/11/16</a:t>
+              <a:t>5/13/16</a:t>
             </a:fld>
             <a:endParaRPr lang="en-US"/>
           </a:p>
@@ -3478,14 +3478,7 @@
                 <a:latin typeface="Arial"/>
                 <a:cs typeface="Arial"/>
               </a:rPr>
-              <a:t>ADSP </a:t>
-            </a:r>
-            <a:r>
-              <a:rPr lang="en-US" b="1" dirty="0" smtClean="0">
-                <a:latin typeface="Arial"/>
-                <a:cs typeface="Arial"/>
-              </a:rPr>
-              <a:t>WGS project</a:t>
+              <a:t>ADSP WGS project</a:t>
             </a:r>
             <a:endParaRPr lang="en-US" b="1" dirty="0">
               <a:latin typeface="Arial"/>
@@ -3609,14 +3602,7 @@
                 <a:latin typeface="Arial Narrow"/>
                 <a:cs typeface="Arial Narrow"/>
               </a:rPr>
-              <a:t>ovariates: Age, </a:t>
-            </a:r>
-            <a:r>
-              <a:rPr lang="en-US" sz="2400" b="1" dirty="0" smtClean="0">
-                <a:latin typeface="Arial Narrow"/>
-                <a:cs typeface="Arial Narrow"/>
-              </a:rPr>
-              <a:t>Sex</a:t>
+              <a:t>ovariates: Age, Sex</a:t>
             </a:r>
           </a:p>
           <a:p>
@@ -4047,7 +4033,35 @@
                 <a:latin typeface="Arial Narrow"/>
                 <a:cs typeface="Arial Narrow"/>
               </a:rPr>
-              <a:t>GWAS of ADSP WGS using CS’s variants</a:t>
+              <a:t>GWAS of ADSP WGS </a:t>
+            </a:r>
+            <a:r>
+              <a:rPr lang="en-US" sz="2400" b="1" smtClean="0">
+                <a:latin typeface="Arial Narrow"/>
+                <a:cs typeface="Arial Narrow"/>
+              </a:rPr>
+              <a:t>using </a:t>
+            </a:r>
+            <a:r>
+              <a:rPr lang="en-US" sz="2400" b="1" smtClean="0">
+                <a:latin typeface="Arial Narrow"/>
+                <a:cs typeface="Arial Narrow"/>
+              </a:rPr>
+              <a:t>ADSP</a:t>
+            </a:r>
+            <a:r>
+              <a:rPr lang="en-US" sz="2400" b="1" smtClean="0">
+                <a:latin typeface="Arial Narrow"/>
+                <a:cs typeface="Arial Narrow"/>
+              </a:rPr>
+              <a:t>’s </a:t>
+            </a:r>
+            <a:r>
+              <a:rPr lang="en-US" sz="2400" b="1" dirty="0" smtClean="0">
+                <a:latin typeface="Arial Narrow"/>
+                <a:cs typeface="Arial Narrow"/>
+              </a:rPr>
+              <a:t>variants</a:t>
             </a:r>
             <a:endParaRPr lang="en-US" sz="2400" b="1" dirty="0">
               <a:latin typeface="Arial Narrow"/>
@@ -4089,7 +4103,7 @@
       </p:sp>
       <p:pic>
         <p:nvPicPr>
-          <p:cNvPr id="3" name="Picture 2" descr="manhattan_mcmc.png"/>
+          <p:cNvPr id="2" name="Picture 1" descr="manhattan_mcmc.png"/>
           <p:cNvPicPr>
             <a:picLocks noChangeAspect="1"/>
           </p:cNvPicPr>
@@ -4109,7 +4123,7 @@
         </p:blipFill>
         <p:spPr>
           <a:xfrm>
-            <a:off x="0" y="1569927"/>
+            <a:off x="0" y="1700047"/>
             <a:ext cx="9144000" cy="4572000"/>
           </a:xfrm>
           <a:prstGeom prst="rect">
@@ -4182,330 +4196,28 @@
                 <a:latin typeface="Arial Narrow"/>
                 <a:cs typeface="Arial Narrow"/>
               </a:rPr>
-              <a:t>chr</a:t>
+              <a:t>4 </a:t>
             </a:r>
             <a:r>
               <a:rPr lang="en-US" sz="2400" b="1" dirty="0" smtClean="0">
                 <a:latin typeface="Arial Narrow"/>
                 <a:cs typeface="Arial Narrow"/>
               </a:rPr>
-              <a:t>2</a:t>
-            </a:r>
-            <a:r>
-              <a:rPr lang="en-US" sz="2400" b="1" dirty="0">
-                <a:latin typeface="Arial Narrow"/>
-                <a:cs typeface="Arial Narrow"/>
-              </a:rPr>
-              <a:t>:40973289_C/T</a:t>
-            </a:r>
-            <a:endParaRPr lang="en-US" sz="2400" b="1" dirty="0">
-              <a:latin typeface="Arial Narrow"/>
-              <a:cs typeface="Arial Narrow"/>
-            </a:endParaRPr>
-          </a:p>
-        </p:txBody>
-      </p:sp>
-      <p:pic>
-        <p:nvPicPr>
-          <p:cNvPr id="5" name="Picture 4" descr="loci.pdf"/>
-          <p:cNvPicPr>
-            <a:picLocks noChangeAspect="1"/>
-          </p:cNvPicPr>
-          <p:nvPr/>
-        </p:nvPicPr>
-        <p:blipFill>
-          <a:blip r:embed="rId2">
-            <a:extLst>
-              <a:ext uri="{28A0092B-C50C-407E-A947-70E740481C1C}">
-                <a14:useLocalDpi xmlns:a14="http://schemas.microsoft.com/office/drawing/2010/main" val="0"/>
-              </a:ext>
-            </a:extLst>
-          </a:blip>
-          <a:stretch>
-            <a:fillRect/>
-          </a:stretch>
-        </p:blipFill>
-        <p:spPr>
-          <a:xfrm>
-            <a:off x="2436875" y="1206136"/>
-            <a:ext cx="3889846" cy="3889846"/>
-          </a:xfrm>
-          <a:prstGeom prst="rect">
-            <a:avLst/>
-          </a:prstGeom>
-        </p:spPr>
-      </p:pic>
-      <p:sp>
-        <p:nvSpPr>
-          <p:cNvPr id="6" name="Rectangle 5"/>
-          <p:cNvSpPr/>
-          <p:nvPr/>
-        </p:nvSpPr>
-        <p:spPr>
-          <a:xfrm>
-            <a:off x="501363" y="5095982"/>
-            <a:ext cx="8280219" cy="584776"/>
-          </a:xfrm>
-          <a:prstGeom prst="rect">
-            <a:avLst/>
-          </a:prstGeom>
-        </p:spPr>
-        <p:txBody>
-          <a:bodyPr wrap="square">
-            <a:spAutoFit/>
-          </a:bodyPr>
-          <a:lstStyle/>
-          <a:p>
-            <a:pPr marL="285750" indent="-285750">
-              <a:buFont typeface="Arial"/>
-              <a:buChar char="•"/>
-            </a:pPr>
-            <a:r>
-              <a:rPr lang="en-US" sz="1600" b="1" dirty="0">
-                <a:latin typeface="Arial Narrow"/>
-                <a:cs typeface="Arial Narrow"/>
-              </a:rPr>
-              <a:t>MAF </a:t>
-            </a:r>
-            <a:r>
-              <a:rPr lang="en-US" sz="1600" b="1" dirty="0" smtClean="0">
-                <a:latin typeface="Arial Narrow"/>
-                <a:cs typeface="Arial Narrow"/>
-              </a:rPr>
-              <a:t>0.479</a:t>
-            </a:r>
-          </a:p>
-          <a:p>
-            <a:pPr marL="285750" indent="-285750">
-              <a:buFont typeface="Arial"/>
-              <a:buChar char="•"/>
-            </a:pPr>
-            <a:r>
-              <a:rPr lang="en-US" sz="1600" b="1" dirty="0" smtClean="0">
-                <a:latin typeface="Arial Narrow"/>
-                <a:cs typeface="Arial Narrow"/>
-              </a:rPr>
-              <a:t>IGAP does not support</a:t>
-            </a:r>
-            <a:endParaRPr lang="en-US" sz="1600" b="1" dirty="0" smtClean="0">
-              <a:latin typeface="Arial Narrow"/>
-              <a:cs typeface="Arial Narrow"/>
-            </a:endParaRPr>
-          </a:p>
-        </p:txBody>
-      </p:sp>
-      <p:pic>
-        <p:nvPicPr>
-          <p:cNvPr id="7" name="Picture 6" descr="Screen Shot 2016-05-11 at 1.53.09 PM.png"/>
-          <p:cNvPicPr>
-            <a:picLocks noChangeAspect="1"/>
-          </p:cNvPicPr>
-          <p:nvPr/>
-        </p:nvPicPr>
-        <p:blipFill rotWithShape="1">
-          <a:blip r:embed="rId3">
-            <a:extLst>
-              <a:ext uri="{28A0092B-C50C-407E-A947-70E740481C1C}">
-                <a14:useLocalDpi xmlns:a14="http://schemas.microsoft.com/office/drawing/2010/main" val="0"/>
-              </a:ext>
-            </a:extLst>
-          </a:blip>
-          <a:srcRect l="6756"/>
-          <a:stretch/>
-        </p:blipFill>
-        <p:spPr>
-          <a:xfrm>
-            <a:off x="255381" y="5814231"/>
-            <a:ext cx="8526201" cy="431321"/>
-          </a:xfrm>
-          <a:prstGeom prst="rect">
-            <a:avLst/>
-          </a:prstGeom>
-        </p:spPr>
-      </p:pic>
-    </p:spTree>
-    <p:extLst>
-      <p:ext uri="{BB962C8B-B14F-4D97-AF65-F5344CB8AC3E}">
-        <p14:creationId xmlns:p14="http://schemas.microsoft.com/office/powerpoint/2010/main" val="3321390007"/>
-      </p:ext>
-    </p:extLst>
-  </p:cSld>
-  <p:clrMapOvr>
-    <a:masterClrMapping/>
-  </p:clrMapOvr>
-  <p:timing>
-    <p:tnLst>
-      <p:par>
-        <p:cTn xmlns:p14="http://schemas.microsoft.com/office/powerpoint/2010/main" id="1" dur="indefinite" restart="never" nodeType="tmRoot"/>
-      </p:par>
-    </p:tnLst>
-  </p:timing>
-</p:sld>
-</file>
-
-<file path=ppt/slides/slide6.xml><?xml version="1.0" encoding="utf-8"?>
-<p:sld xmlns:a="http://schemas.openxmlformats.org/drawingml/2006/main" xmlns:r="http://schemas.openxmlformats.org/officeDocument/2006/relationships" xmlns:p="http://schemas.openxmlformats.org/presentationml/2006/main">
-  <p:cSld>
-    <p:spTree>
-      <p:nvGrpSpPr>
-        <p:cNvPr id="1" name=""/>
-        <p:cNvGrpSpPr/>
-        <p:nvPr/>
-      </p:nvGrpSpPr>
-      <p:grpSpPr>
-        <a:xfrm>
-          <a:off x="0" y="0"/>
-          <a:ext cx="0" cy="0"/>
-          <a:chOff x="0" y="0"/>
-          <a:chExt cx="0" cy="0"/>
-        </a:xfrm>
-      </p:grpSpPr>
-      <p:sp>
-        <p:nvSpPr>
-          <p:cNvPr id="4" name="TextBox 3"/>
-          <p:cNvSpPr txBox="1"/>
-          <p:nvPr/>
-        </p:nvSpPr>
-        <p:spPr>
-          <a:xfrm>
-            <a:off x="0" y="320374"/>
-            <a:ext cx="9144000" cy="461665"/>
-          </a:xfrm>
-          <a:prstGeom prst="rect">
-            <a:avLst/>
-          </a:prstGeom>
-          <a:noFill/>
-        </p:spPr>
-        <p:txBody>
-          <a:bodyPr wrap="square" rtlCol="0">
-            <a:spAutoFit/>
-          </a:bodyPr>
-          <a:lstStyle/>
-          <a:p>
-            <a:pPr algn="ctr"/>
+              <a:t>significant variants in </a:t>
+            </a:r>
             <a:r>
               <a:rPr lang="en-US" sz="2400" b="1" dirty="0" smtClean="0">
                 <a:latin typeface="Arial Narrow"/>
                 <a:cs typeface="Arial Narrow"/>
               </a:rPr>
-              <a:t>chr</a:t>
+              <a:t>3 </a:t>
             </a:r>
             <a:r>
               <a:rPr lang="en-US" sz="2400" b="1" dirty="0" smtClean="0">
                 <a:latin typeface="Arial Narrow"/>
                 <a:cs typeface="Arial Narrow"/>
               </a:rPr>
-              <a:t>2</a:t>
-            </a:r>
-            <a:r>
-              <a:rPr lang="en-US" sz="2400" b="1" dirty="0">
-                <a:latin typeface="Arial Narrow"/>
-                <a:cs typeface="Arial Narrow"/>
-              </a:rPr>
-              <a:t>:40973289_C/T</a:t>
-            </a:r>
-            <a:endParaRPr lang="en-US" sz="2400" b="1" dirty="0">
-              <a:latin typeface="Arial Narrow"/>
-              <a:cs typeface="Arial Narrow"/>
-            </a:endParaRPr>
-          </a:p>
-        </p:txBody>
-      </p:sp>
-      <p:pic>
-        <p:nvPicPr>
-          <p:cNvPr id="3" name="Picture 2" descr="Screen Shot 2016-05-11 at 1.41.33 PM.png"/>
-          <p:cNvPicPr>
-            <a:picLocks noChangeAspect="1"/>
-          </p:cNvPicPr>
-          <p:nvPr/>
-        </p:nvPicPr>
-        <p:blipFill rotWithShape="1">
-          <a:blip r:embed="rId2">
-            <a:extLst>
-              <a:ext uri="{28A0092B-C50C-407E-A947-70E740481C1C}">
-                <a14:useLocalDpi xmlns:a14="http://schemas.microsoft.com/office/drawing/2010/main" val="0"/>
-              </a:ext>
-            </a:extLst>
-          </a:blip>
-          <a:srcRect b="29791"/>
-          <a:stretch/>
-        </p:blipFill>
-        <p:spPr>
-          <a:xfrm>
-            <a:off x="0" y="1391699"/>
-            <a:ext cx="9144000" cy="4054655"/>
-          </a:xfrm>
-          <a:prstGeom prst="rect">
-            <a:avLst/>
-          </a:prstGeom>
-        </p:spPr>
-      </p:pic>
-    </p:spTree>
-    <p:extLst>
-      <p:ext uri="{BB962C8B-B14F-4D97-AF65-F5344CB8AC3E}">
-        <p14:creationId xmlns:p14="http://schemas.microsoft.com/office/powerpoint/2010/main" val="4258748370"/>
-      </p:ext>
-    </p:extLst>
-  </p:cSld>
-  <p:clrMapOvr>
-    <a:masterClrMapping/>
-  </p:clrMapOvr>
-  <p:timing>
-    <p:tnLst>
-      <p:par>
-        <p:cTn xmlns:p14="http://schemas.microsoft.com/office/powerpoint/2010/main" id="1" dur="indefinite" restart="never" nodeType="tmRoot"/>
-      </p:par>
-    </p:tnLst>
-  </p:timing>
-</p:sld>
-</file>
-
-<file path=ppt/slides/slide7.xml><?xml version="1.0" encoding="utf-8"?>
-<p:sld xmlns:a="http://schemas.openxmlformats.org/drawingml/2006/main" xmlns:r="http://schemas.openxmlformats.org/officeDocument/2006/relationships" xmlns:p="http://schemas.openxmlformats.org/presentationml/2006/main">
-  <p:cSld>
-    <p:spTree>
-      <p:nvGrpSpPr>
-        <p:cNvPr id="1" name=""/>
-        <p:cNvGrpSpPr/>
-        <p:nvPr/>
-      </p:nvGrpSpPr>
-      <p:grpSpPr>
-        <a:xfrm>
-          <a:off x="0" y="0"/>
-          <a:ext cx="0" cy="0"/>
-          <a:chOff x="0" y="0"/>
-          <a:chExt cx="0" cy="0"/>
-        </a:xfrm>
-      </p:grpSpPr>
-      <p:sp>
-        <p:nvSpPr>
-          <p:cNvPr id="4" name="TextBox 3"/>
-          <p:cNvSpPr txBox="1"/>
-          <p:nvPr/>
-        </p:nvSpPr>
-        <p:spPr>
-          <a:xfrm>
-            <a:off x="0" y="320374"/>
-            <a:ext cx="9144000" cy="461665"/>
-          </a:xfrm>
-          <a:prstGeom prst="rect">
-            <a:avLst/>
-          </a:prstGeom>
-          <a:noFill/>
-        </p:spPr>
-        <p:txBody>
-          <a:bodyPr wrap="square" rtlCol="0">
-            <a:spAutoFit/>
-          </a:bodyPr>
-          <a:lstStyle/>
-          <a:p>
-            <a:pPr algn="ctr"/>
-            <a:r>
-              <a:rPr lang="en-US" sz="2400" b="1" dirty="0" smtClean="0">
-                <a:latin typeface="Arial Narrow"/>
-                <a:cs typeface="Arial Narrow"/>
-              </a:rPr>
-              <a:t>3 significant variants in 2 loci, all intergenic</a:t>
+              <a:t>loci, all intergenic</a:t>
             </a:r>
             <a:endParaRPr lang="en-US" sz="2400" b="1" dirty="0">
               <a:latin typeface="Arial Narrow"/>
@@ -4646,7 +4358,304 @@
     </p:spTree>
     <p:extLst>
       <p:ext uri="{BB962C8B-B14F-4D97-AF65-F5344CB8AC3E}">
-        <p14:creationId xmlns:p14="http://schemas.microsoft.com/office/powerpoint/2010/main" val="2353274756"/>
+        <p14:creationId xmlns:p14="http://schemas.microsoft.com/office/powerpoint/2010/main" val="3894719531"/>
+      </p:ext>
+    </p:extLst>
+  </p:cSld>
+  <p:clrMapOvr>
+    <a:masterClrMapping/>
+  </p:clrMapOvr>
+  <p:timing>
+    <p:tnLst>
+      <p:par>
+        <p:cTn xmlns:p14="http://schemas.microsoft.com/office/powerpoint/2010/main" id="1" dur="indefinite" restart="never" nodeType="tmRoot"/>
+      </p:par>
+    </p:tnLst>
+  </p:timing>
+</p:sld>
+</file>
+
+<file path=ppt/slides/slide6.xml><?xml version="1.0" encoding="utf-8"?>
+<p:sld xmlns:a="http://schemas.openxmlformats.org/drawingml/2006/main" xmlns:r="http://schemas.openxmlformats.org/officeDocument/2006/relationships" xmlns:p="http://schemas.openxmlformats.org/presentationml/2006/main">
+  <p:cSld>
+    <p:spTree>
+      <p:nvGrpSpPr>
+        <p:cNvPr id="1" name=""/>
+        <p:cNvGrpSpPr/>
+        <p:nvPr/>
+      </p:nvGrpSpPr>
+      <p:grpSpPr>
+        <a:xfrm>
+          <a:off x="0" y="0"/>
+          <a:ext cx="0" cy="0"/>
+          <a:chOff x="0" y="0"/>
+          <a:chExt cx="0" cy="0"/>
+        </a:xfrm>
+      </p:grpSpPr>
+      <p:sp>
+        <p:nvSpPr>
+          <p:cNvPr id="4" name="TextBox 3"/>
+          <p:cNvSpPr txBox="1"/>
+          <p:nvPr/>
+        </p:nvSpPr>
+        <p:spPr>
+          <a:xfrm>
+            <a:off x="0" y="320374"/>
+            <a:ext cx="9144000" cy="461665"/>
+          </a:xfrm>
+          <a:prstGeom prst="rect">
+            <a:avLst/>
+          </a:prstGeom>
+          <a:noFill/>
+        </p:spPr>
+        <p:txBody>
+          <a:bodyPr wrap="square" rtlCol="0">
+            <a:spAutoFit/>
+          </a:bodyPr>
+          <a:lstStyle/>
+          <a:p>
+            <a:pPr algn="ctr"/>
+            <a:r>
+              <a:rPr lang="en-US" sz="2400" b="1" dirty="0" smtClean="0">
+                <a:latin typeface="Arial Narrow"/>
+                <a:cs typeface="Arial Narrow"/>
+              </a:rPr>
+              <a:t>chr2</a:t>
+            </a:r>
+            <a:r>
+              <a:rPr lang="en-US" sz="2400" b="1" dirty="0">
+                <a:latin typeface="Arial Narrow"/>
+                <a:cs typeface="Arial Narrow"/>
+              </a:rPr>
+              <a:t>:40973289_C/T</a:t>
+            </a:r>
+          </a:p>
+        </p:txBody>
+      </p:sp>
+      <p:pic>
+        <p:nvPicPr>
+          <p:cNvPr id="5" name="Picture 4" descr="loci.pdf"/>
+          <p:cNvPicPr>
+            <a:picLocks noChangeAspect="1"/>
+          </p:cNvPicPr>
+          <p:nvPr/>
+        </p:nvPicPr>
+        <p:blipFill>
+          <a:blip r:embed="rId2">
+            <a:extLst>
+              <a:ext uri="{28A0092B-C50C-407E-A947-70E740481C1C}">
+                <a14:useLocalDpi xmlns:a14="http://schemas.microsoft.com/office/drawing/2010/main" val="0"/>
+              </a:ext>
+            </a:extLst>
+          </a:blip>
+          <a:stretch>
+            <a:fillRect/>
+          </a:stretch>
+        </p:blipFill>
+        <p:spPr>
+          <a:xfrm>
+            <a:off x="2436875" y="1206136"/>
+            <a:ext cx="3889846" cy="3889846"/>
+          </a:xfrm>
+          <a:prstGeom prst="rect">
+            <a:avLst/>
+          </a:prstGeom>
+        </p:spPr>
+      </p:pic>
+      <p:sp>
+        <p:nvSpPr>
+          <p:cNvPr id="6" name="Rectangle 5"/>
+          <p:cNvSpPr/>
+          <p:nvPr/>
+        </p:nvSpPr>
+        <p:spPr>
+          <a:xfrm>
+            <a:off x="501363" y="5095982"/>
+            <a:ext cx="8280219" cy="584776"/>
+          </a:xfrm>
+          <a:prstGeom prst="rect">
+            <a:avLst/>
+          </a:prstGeom>
+        </p:spPr>
+        <p:txBody>
+          <a:bodyPr wrap="square">
+            <a:spAutoFit/>
+          </a:bodyPr>
+          <a:lstStyle/>
+          <a:p>
+            <a:pPr marL="285750" indent="-285750">
+              <a:buFont typeface="Arial"/>
+              <a:buChar char="•"/>
+            </a:pPr>
+            <a:r>
+              <a:rPr lang="en-US" sz="1600" b="1" dirty="0">
+                <a:latin typeface="Arial Narrow"/>
+                <a:cs typeface="Arial Narrow"/>
+              </a:rPr>
+              <a:t>MAF </a:t>
+            </a:r>
+            <a:r>
+              <a:rPr lang="en-US" sz="1600" b="1" dirty="0" smtClean="0">
+                <a:latin typeface="Arial Narrow"/>
+                <a:cs typeface="Arial Narrow"/>
+              </a:rPr>
+              <a:t>0.479</a:t>
+            </a:r>
+          </a:p>
+          <a:p>
+            <a:pPr marL="285750" indent="-285750">
+              <a:buFont typeface="Arial"/>
+              <a:buChar char="•"/>
+            </a:pPr>
+            <a:r>
+              <a:rPr lang="en-US" sz="1600" b="1" dirty="0" smtClean="0">
+                <a:latin typeface="Arial Narrow"/>
+                <a:cs typeface="Arial Narrow"/>
+              </a:rPr>
+              <a:t>IGAP does not support</a:t>
+            </a:r>
+          </a:p>
+        </p:txBody>
+      </p:sp>
+      <p:pic>
+        <p:nvPicPr>
+          <p:cNvPr id="7" name="Picture 6" descr="Screen Shot 2016-05-11 at 1.53.09 PM.png"/>
+          <p:cNvPicPr>
+            <a:picLocks noChangeAspect="1"/>
+          </p:cNvPicPr>
+          <p:nvPr/>
+        </p:nvPicPr>
+        <p:blipFill rotWithShape="1">
+          <a:blip r:embed="rId3">
+            <a:extLst>
+              <a:ext uri="{28A0092B-C50C-407E-A947-70E740481C1C}">
+                <a14:useLocalDpi xmlns:a14="http://schemas.microsoft.com/office/drawing/2010/main" val="0"/>
+              </a:ext>
+            </a:extLst>
+          </a:blip>
+          <a:srcRect l="6756"/>
+          <a:stretch/>
+        </p:blipFill>
+        <p:spPr>
+          <a:xfrm>
+            <a:off x="255381" y="5814231"/>
+            <a:ext cx="8526201" cy="431321"/>
+          </a:xfrm>
+          <a:prstGeom prst="rect">
+            <a:avLst/>
+          </a:prstGeom>
+        </p:spPr>
+      </p:pic>
+    </p:spTree>
+    <p:extLst>
+      <p:ext uri="{BB962C8B-B14F-4D97-AF65-F5344CB8AC3E}">
+        <p14:creationId xmlns:p14="http://schemas.microsoft.com/office/powerpoint/2010/main" val="3321390007"/>
+      </p:ext>
+    </p:extLst>
+  </p:cSld>
+  <p:clrMapOvr>
+    <a:masterClrMapping/>
+  </p:clrMapOvr>
+  <p:timing>
+    <p:tnLst>
+      <p:par>
+        <p:cTn xmlns:p14="http://schemas.microsoft.com/office/powerpoint/2010/main" id="1" dur="indefinite" restart="never" nodeType="tmRoot"/>
+      </p:par>
+    </p:tnLst>
+  </p:timing>
+</p:sld>
+</file>
+
+<file path=ppt/slides/slide7.xml><?xml version="1.0" encoding="utf-8"?>
+<p:sld xmlns:a="http://schemas.openxmlformats.org/drawingml/2006/main" xmlns:r="http://schemas.openxmlformats.org/officeDocument/2006/relationships" xmlns:p="http://schemas.openxmlformats.org/presentationml/2006/main">
+  <p:cSld>
+    <p:spTree>
+      <p:nvGrpSpPr>
+        <p:cNvPr id="1" name=""/>
+        <p:cNvGrpSpPr/>
+        <p:nvPr/>
+      </p:nvGrpSpPr>
+      <p:grpSpPr>
+        <a:xfrm>
+          <a:off x="0" y="0"/>
+          <a:ext cx="0" cy="0"/>
+          <a:chOff x="0" y="0"/>
+          <a:chExt cx="0" cy="0"/>
+        </a:xfrm>
+      </p:grpSpPr>
+      <p:sp>
+        <p:nvSpPr>
+          <p:cNvPr id="4" name="TextBox 3"/>
+          <p:cNvSpPr txBox="1"/>
+          <p:nvPr/>
+        </p:nvSpPr>
+        <p:spPr>
+          <a:xfrm>
+            <a:off x="0" y="320374"/>
+            <a:ext cx="9144000" cy="461665"/>
+          </a:xfrm>
+          <a:prstGeom prst="rect">
+            <a:avLst/>
+          </a:prstGeom>
+          <a:noFill/>
+        </p:spPr>
+        <p:txBody>
+          <a:bodyPr wrap="square" rtlCol="0">
+            <a:spAutoFit/>
+          </a:bodyPr>
+          <a:lstStyle/>
+          <a:p>
+            <a:pPr algn="ctr"/>
+            <a:r>
+              <a:rPr lang="en-US" sz="2400" b="1" dirty="0" smtClean="0">
+                <a:latin typeface="Arial Narrow"/>
+                <a:cs typeface="Arial Narrow"/>
+              </a:rPr>
+              <a:t>chr2</a:t>
+            </a:r>
+            <a:r>
+              <a:rPr lang="en-US" sz="2400" b="1" dirty="0">
+                <a:latin typeface="Arial Narrow"/>
+                <a:cs typeface="Arial Narrow"/>
+              </a:rPr>
+              <a:t>:40973289_C/T</a:t>
+            </a:r>
+          </a:p>
+        </p:txBody>
+      </p:sp>
+      <p:pic>
+        <p:nvPicPr>
+          <p:cNvPr id="3" name="Picture 2" descr="Screen Shot 2016-05-11 at 1.41.33 PM.png"/>
+          <p:cNvPicPr>
+            <a:picLocks noChangeAspect="1"/>
+          </p:cNvPicPr>
+          <p:nvPr/>
+        </p:nvPicPr>
+        <p:blipFill rotWithShape="1">
+          <a:blip r:embed="rId2">
+            <a:extLst>
+              <a:ext uri="{28A0092B-C50C-407E-A947-70E740481C1C}">
+                <a14:useLocalDpi xmlns:a14="http://schemas.microsoft.com/office/drawing/2010/main" val="0"/>
+              </a:ext>
+            </a:extLst>
+          </a:blip>
+          <a:srcRect b="29791"/>
+          <a:stretch/>
+        </p:blipFill>
+        <p:spPr>
+          <a:xfrm>
+            <a:off x="0" y="1391699"/>
+            <a:ext cx="9144000" cy="4054655"/>
+          </a:xfrm>
+          <a:prstGeom prst="rect">
+            <a:avLst/>
+          </a:prstGeom>
+        </p:spPr>
+      </p:pic>
+    </p:spTree>
+    <p:extLst>
+      <p:ext uri="{BB962C8B-B14F-4D97-AF65-F5344CB8AC3E}">
+        <p14:creationId xmlns:p14="http://schemas.microsoft.com/office/powerpoint/2010/main" val="2891282641"/>
       </p:ext>
     </p:extLst>
   </p:cSld>
@@ -4863,14 +4872,7 @@
                 <a:latin typeface="Arial Narrow"/>
                 <a:cs typeface="Arial Narrow"/>
               </a:rPr>
-              <a:t>ovariates: Age, </a:t>
-            </a:r>
-            <a:r>
-              <a:rPr lang="en-US" sz="2400" b="1" dirty="0" smtClean="0">
-                <a:latin typeface="Arial Narrow"/>
-                <a:cs typeface="Arial Narrow"/>
-              </a:rPr>
-              <a:t>Sex</a:t>
+              <a:t>ovariates: Age, Sex</a:t>
             </a:r>
           </a:p>
           <a:p>

</xml_diff>